<commit_message>
PPP mit Teil Dario
</commit_message>
<xml_diff>
--- a/projects/RECAP SW1 29.pptx
+++ b/projects/RECAP SW1 29.pptx
@@ -13,9 +13,9 @@
   <p:sldIdLst>
     <p:sldId id="257" r:id="rId5"/>
     <p:sldId id="265" r:id="rId6"/>
-    <p:sldId id="266" r:id="rId7"/>
-    <p:sldId id="267" r:id="rId8"/>
-    <p:sldId id="268" r:id="rId9"/>
+    <p:sldId id="277" r:id="rId7"/>
+    <p:sldId id="266" r:id="rId8"/>
+    <p:sldId id="278" r:id="rId9"/>
     <p:sldId id="258" r:id="rId10"/>
     <p:sldId id="276" r:id="rId11"/>
     <p:sldId id="270" r:id="rId12"/>
@@ -131,6 +131,10 @@
     </p:ext>
   </p:extLst>
 </p:presentation>
+</file>
+
+<file path=ppt/revisionInfo.xml><?xml version="1.0" encoding="utf-8"?>
+<p1510:revInfo xmlns:a="http://schemas.openxmlformats.org/drawingml/2006/main" xmlns:r="http://schemas.openxmlformats.org/officeDocument/2006/relationships" xmlns:p1510="http://schemas.microsoft.com/office/powerpoint/2015/10/main"/>
 </file>
 
 <file path=ppt/handoutMasters/handoutMaster1.xml><?xml version="1.0" encoding="utf-8"?>
@@ -956,14 +960,10 @@
         </p:nvSpPr>
         <p:spPr/>
         <p:txBody>
-          <a:bodyPr rtlCol="0"/>
+          <a:bodyPr/>
           <a:lstStyle/>
           <a:p>
-            <a:pPr rtl="0"/>
-            <a:r>
-              <a:rPr lang="de-DE" dirty="0"/>
-              <a:t>NOTIZ: Wenn Sie Bilder auf dieser Folie ändern möchten, wählen Sie sie aus, und löschen Sie sie. Klicken Sie anschließend auf das Symbol "Bild einfügen" im Platzhalter, um Ihr eigenes Bild einzufügen.</a:t>
-            </a:r>
+            <a:endParaRPr lang="de-DE"/>
           </a:p>
         </p:txBody>
       </p:sp>
@@ -979,7 +979,7 @@
         </p:nvSpPr>
         <p:spPr/>
         <p:txBody>
-          <a:bodyPr rtlCol="0"/>
+          <a:bodyPr/>
           <a:lstStyle/>
           <a:p>
             <a:pPr rtl="0"/>
@@ -994,7 +994,7 @@
     </p:spTree>
     <p:extLst>
       <p:ext uri="{BB962C8B-B14F-4D97-AF65-F5344CB8AC3E}">
-        <p14:creationId xmlns:p14="http://schemas.microsoft.com/office/powerpoint/2010/main" val="3727004212"/>
+        <p14:creationId xmlns:p14="http://schemas.microsoft.com/office/powerpoint/2010/main" val="3165157591"/>
       </p:ext>
     </p:extLst>
   </p:cSld>
@@ -1083,7 +1083,7 @@
     </p:spTree>
     <p:extLst>
       <p:ext uri="{BB962C8B-B14F-4D97-AF65-F5344CB8AC3E}">
-        <p14:creationId xmlns:p14="http://schemas.microsoft.com/office/powerpoint/2010/main" val="2235521194"/>
+        <p14:creationId xmlns:p14="http://schemas.microsoft.com/office/powerpoint/2010/main" val="3727004212"/>
       </p:ext>
     </p:extLst>
   </p:cSld>
@@ -1172,7 +1172,7 @@
     </p:spTree>
     <p:extLst>
       <p:ext uri="{BB962C8B-B14F-4D97-AF65-F5344CB8AC3E}">
-        <p14:creationId xmlns:p14="http://schemas.microsoft.com/office/powerpoint/2010/main" val="553265586"/>
+        <p14:creationId xmlns:p14="http://schemas.microsoft.com/office/powerpoint/2010/main" val="1510077531"/>
       </p:ext>
     </p:extLst>
   </p:cSld>
@@ -7510,7 +7510,7 @@
           <a:graphicData uri="http://schemas.openxmlformats.org/presentationml/2006/ole">
             <mc:AlternateContent xmlns:mc="http://schemas.openxmlformats.org/markup-compatibility/2006">
               <mc:Choice xmlns:v="urn:schemas-microsoft-com:vml" Requires="v">
-                <p:oleObj spid="_x0000_s1030" name="think-cell Folie" r:id="rId6" imgW="624" imgH="623" progId="TCLayout.ActiveDocument.1">
+                <p:oleObj spid="_x0000_s1032" name="think-cell Folie" r:id="rId6" imgW="624" imgH="623" progId="TCLayout.ActiveDocument.1">
                   <p:embed/>
                 </p:oleObj>
               </mc:Choice>
@@ -7738,7 +7738,7 @@
           <a:graphicData uri="http://schemas.openxmlformats.org/presentationml/2006/ole">
             <mc:AlternateContent xmlns:mc="http://schemas.openxmlformats.org/markup-compatibility/2006">
               <mc:Choice xmlns:v="urn:schemas-microsoft-com:vml" Requires="v">
-                <p:oleObj spid="_x0000_s8195" name="think-cell Folie" r:id="rId6" imgW="624" imgH="623" progId="TCLayout.ActiveDocument.1">
+                <p:oleObj spid="_x0000_s8197" name="think-cell Folie" r:id="rId6" imgW="624" imgH="623" progId="TCLayout.ActiveDocument.1">
                   <p:embed/>
                 </p:oleObj>
               </mc:Choice>
@@ -7941,7 +7941,7 @@
           <a:graphicData uri="http://schemas.openxmlformats.org/presentationml/2006/ole">
             <mc:AlternateContent xmlns:mc="http://schemas.openxmlformats.org/markup-compatibility/2006">
               <mc:Choice xmlns:v="urn:schemas-microsoft-com:vml" Requires="v">
-                <p:oleObj spid="_x0000_s5123" name="think-cell Folie" r:id="rId6" imgW="624" imgH="623" progId="TCLayout.ActiveDocument.1">
+                <p:oleObj spid="_x0000_s5125" name="think-cell Folie" r:id="rId6" imgW="624" imgH="623" progId="TCLayout.ActiveDocument.1">
                   <p:embed/>
                 </p:oleObj>
               </mc:Choice>
@@ -8163,127 +8163,175 @@
           <a:chExt cx="0" cy="0"/>
         </a:xfrm>
       </p:grpSpPr>
-      <p:sp>
-        <p:nvSpPr>
-          <p:cNvPr id="11" name="Titel 10"/>
-          <p:cNvSpPr>
-            <a:spLocks noGrp="1"/>
-          </p:cNvSpPr>
-          <p:nvPr>
-            <p:ph type="title"/>
-          </p:nvPr>
-        </p:nvSpPr>
-        <p:spPr/>
-        <p:txBody>
-          <a:bodyPr rtlCol="0"/>
+      <p:graphicFrame>
+        <p:nvGraphicFramePr>
+          <p:cNvPr id="4" name="Objekt 3" hidden="1">
+            <a:extLst>
+              <a:ext uri="{FF2B5EF4-FFF2-40B4-BE49-F238E27FC236}">
+                <a16:creationId xmlns:a16="http://schemas.microsoft.com/office/drawing/2014/main" id="{3FFABD67-EFA4-46C3-9F73-390E2CA85C22}"/>
+              </a:ext>
+            </a:extLst>
+          </p:cNvPr>
+          <p:cNvGraphicFramePr>
+            <a:graphicFrameLocks noChangeAspect="1"/>
+          </p:cNvGraphicFramePr>
+          <p:nvPr>
+            <p:custDataLst>
+              <p:tags r:id="rId2"/>
+            </p:custDataLst>
+            <p:extLst/>
+          </p:nvPr>
+        </p:nvGraphicFramePr>
+        <p:xfrm>
+          <a:off x="1588" y="1588"/>
+          <a:ext cx="1588" cy="1588"/>
+        </p:xfrm>
+        <a:graphic>
+          <a:graphicData uri="http://schemas.openxmlformats.org/presentationml/2006/ole">
+            <mc:AlternateContent xmlns:mc="http://schemas.openxmlformats.org/markup-compatibility/2006">
+              <mc:Choice xmlns:v="urn:schemas-microsoft-com:vml" Requires="v">
+                <p:oleObj spid="_x0000_s9219" name="think-cell Folie" r:id="rId6" imgW="624" imgH="623" progId="TCLayout.ActiveDocument.1">
+                  <p:embed/>
+                </p:oleObj>
+              </mc:Choice>
+              <mc:Fallback>
+                <p:oleObj name="think-cell Folie" r:id="rId6" imgW="624" imgH="623" progId="TCLayout.ActiveDocument.1">
+                  <p:embed/>
+                  <p:pic>
+                    <p:nvPicPr>
+                      <p:cNvPr id="4" name="Objekt 3" hidden="1">
+                        <a:extLst>
+                          <a:ext uri="{FF2B5EF4-FFF2-40B4-BE49-F238E27FC236}">
+                            <a16:creationId xmlns:a16="http://schemas.microsoft.com/office/drawing/2014/main" id="{3FFABD67-EFA4-46C3-9F73-390E2CA85C22}"/>
+                          </a:ext>
+                        </a:extLst>
+                      </p:cNvPr>
+                      <p:cNvPicPr/>
+                      <p:nvPr/>
+                    </p:nvPicPr>
+                    <p:blipFill>
+                      <a:blip r:embed="rId7"/>
+                      <a:stretch>
+                        <a:fillRect/>
+                      </a:stretch>
+                    </p:blipFill>
+                    <p:spPr>
+                      <a:xfrm>
+                        <a:off x="1588" y="1588"/>
+                        <a:ext cx="1588" cy="1588"/>
+                      </a:xfrm>
+                      <a:prstGeom prst="rect">
+                        <a:avLst/>
+                      </a:prstGeom>
+                    </p:spPr>
+                  </p:pic>
+                </p:oleObj>
+              </mc:Fallback>
+            </mc:AlternateContent>
+          </a:graphicData>
+        </a:graphic>
+      </p:graphicFrame>
+      <p:sp>
+        <p:nvSpPr>
+          <p:cNvPr id="5" name="Rechteck 4" hidden="1">
+            <a:extLst>
+              <a:ext uri="{FF2B5EF4-FFF2-40B4-BE49-F238E27FC236}">
+                <a16:creationId xmlns:a16="http://schemas.microsoft.com/office/drawing/2014/main" id="{DB6A2D9B-5517-4DBF-A205-FEB8F95834DD}"/>
+              </a:ext>
+            </a:extLst>
+          </p:cNvPr>
+          <p:cNvSpPr/>
+          <p:nvPr>
+            <p:custDataLst>
+              <p:tags r:id="rId3"/>
+            </p:custDataLst>
+          </p:nvPr>
+        </p:nvSpPr>
+        <p:spPr>
+          <a:xfrm>
+            <a:off x="0" y="0"/>
+            <a:ext cx="158750" cy="158750"/>
+          </a:xfrm>
+          <a:prstGeom prst="rect">
+            <a:avLst/>
+          </a:prstGeom>
+        </p:spPr>
+        <p:style>
+          <a:lnRef idx="2">
+            <a:schemeClr val="accent1">
+              <a:shade val="50000"/>
+            </a:schemeClr>
+          </a:lnRef>
+          <a:fillRef idx="1">
+            <a:schemeClr val="accent1"/>
+          </a:fillRef>
+          <a:effectRef idx="0">
+            <a:schemeClr val="accent1"/>
+          </a:effectRef>
+          <a:fontRef idx="minor">
+            <a:schemeClr val="lt1"/>
+          </a:fontRef>
+        </p:style>
+        <p:txBody>
+          <a:bodyPr vert="horz" wrap="none" lIns="0" tIns="0" rIns="0" bIns="0" numCol="1" spcCol="0" rtlCol="0" anchor="ctr" anchorCtr="0">
+            <a:noAutofit/>
+          </a:bodyPr>
           <a:lstStyle/>
           <a:p>
-            <a:pPr rtl="0"/>
-            <a:r>
-              <a:rPr lang="de-DE" dirty="0"/>
-              <a:t>Zwei Bilder mit Beschriftungen</a:t>
-            </a:r>
+            <a:pPr algn="ctr">
+              <a:lnSpc>
+                <a:spcPct val="90000"/>
+              </a:lnSpc>
+              <a:spcBef>
+                <a:spcPct val="0"/>
+              </a:spcBef>
+              <a:spcAft>
+                <a:spcPct val="0"/>
+              </a:spcAft>
+            </a:pPr>
+            <a:endParaRPr lang="de-DE" sz="4400" dirty="0">
+              <a:latin typeface="Times New Roman" panose="02020603050405020304" pitchFamily="18" charset="0"/>
+              <a:ea typeface="+mj-ea"/>
+              <a:cs typeface="+mj-cs"/>
+              <a:sym typeface="Times New Roman" panose="02020603050405020304" pitchFamily="18" charset="0"/>
+            </a:endParaRPr>
           </a:p>
         </p:txBody>
       </p:sp>
       <p:pic>
         <p:nvPicPr>
-          <p:cNvPr id="6" name="Bildplatzhalter 5" descr="Mädchen mit einer Eiswaffel"/>
-          <p:cNvPicPr>
-            <a:picLocks noGrp="1" noChangeAspect="1"/>
-          </p:cNvPicPr>
-          <p:nvPr>
-            <p:ph type="pic" sz="quarter" idx="13"/>
-          </p:nvPr>
-        </p:nvPicPr>
-        <p:blipFill rotWithShape="1">
-          <a:blip r:embed="rId3" cstate="print">
+          <p:cNvPr id="10" name="Grafik 9">
             <a:extLst>
-              <a:ext uri="{28A0092B-C50C-407E-A947-70E740481C1C}">
-                <a14:useLocalDpi xmlns:a14="http://schemas.microsoft.com/office/drawing/2010/main" val="0"/>
+              <a:ext uri="{FF2B5EF4-FFF2-40B4-BE49-F238E27FC236}">
+                <a16:creationId xmlns:a16="http://schemas.microsoft.com/office/drawing/2014/main" id="{304E2BF9-8ADD-4A18-AD90-13423319077E}"/>
               </a:ext>
             </a:extLst>
-          </a:blip>
-          <a:srcRect l="165" r="165"/>
-          <a:stretch/>
-        </p:blipFill>
-        <p:spPr/>
-      </p:pic>
-      <p:sp>
-        <p:nvSpPr>
-          <p:cNvPr id="4" name="Textplatzhalter 3"/>
-          <p:cNvSpPr>
-            <a:spLocks noGrp="1"/>
-          </p:cNvSpPr>
-          <p:nvPr>
-            <p:ph type="body" sz="quarter" idx="14"/>
-          </p:nvPr>
-        </p:nvSpPr>
-        <p:spPr/>
-        <p:txBody>
-          <a:bodyPr rtlCol="0"/>
-          <a:lstStyle/>
-          <a:p>
-            <a:pPr rtl="0"/>
-            <a:r>
-              <a:rPr lang="de-DE" dirty="0"/>
-              <a:t>Beschriftung</a:t>
-            </a:r>
-          </a:p>
-        </p:txBody>
-      </p:sp>
-      <p:pic>
-        <p:nvPicPr>
-          <p:cNvPr id="3" name="Bildplatzhalter 2" descr="Fliegende Ballons vor Wolken"/>
+          </p:cNvPr>
           <p:cNvPicPr>
-            <a:picLocks noGrp="1" noChangeAspect="1"/>
+            <a:picLocks noChangeAspect="1"/>
           </p:cNvPicPr>
-          <p:nvPr>
-            <p:ph type="pic" sz="quarter" idx="15"/>
-          </p:nvPr>
+          <p:nvPr/>
         </p:nvPicPr>
         <p:blipFill>
-          <a:blip r:embed="rId4" cstate="print">
-            <a:extLst>
-              <a:ext uri="{28A0092B-C50C-407E-A947-70E740481C1C}">
-                <a14:useLocalDpi xmlns:a14="http://schemas.microsoft.com/office/drawing/2010/main" val="0"/>
-              </a:ext>
-            </a:extLst>
-          </a:blip>
-          <a:srcRect l="1502" r="1502"/>
+          <a:blip r:embed="rId8"/>
           <a:stretch>
             <a:fillRect/>
           </a:stretch>
         </p:blipFill>
-        <p:spPr/>
+        <p:spPr>
+          <a:xfrm>
+            <a:off x="1" y="0"/>
+            <a:ext cx="9264352" cy="6846168"/>
+          </a:xfrm>
+          <a:prstGeom prst="rect">
+            <a:avLst/>
+          </a:prstGeom>
+        </p:spPr>
       </p:pic>
-      <p:sp>
-        <p:nvSpPr>
-          <p:cNvPr id="5" name="Textplatzhalter 4"/>
-          <p:cNvSpPr>
-            <a:spLocks noGrp="1"/>
-          </p:cNvSpPr>
-          <p:nvPr>
-            <p:ph type="body" sz="quarter" idx="16"/>
-          </p:nvPr>
-        </p:nvSpPr>
-        <p:spPr/>
-        <p:txBody>
-          <a:bodyPr rtlCol="0"/>
-          <a:lstStyle/>
-          <a:p>
-            <a:pPr rtl="0"/>
-            <a:r>
-              <a:rPr lang="de-DE" dirty="0"/>
-              <a:t>Beschriftung</a:t>
-            </a:r>
-          </a:p>
-        </p:txBody>
-      </p:sp>
     </p:spTree>
     <p:extLst>
       <p:ext uri="{BB962C8B-B14F-4D97-AF65-F5344CB8AC3E}">
-        <p14:creationId xmlns:p14="http://schemas.microsoft.com/office/powerpoint/2010/main" val="3864440091"/>
+        <p14:creationId xmlns:p14="http://schemas.microsoft.com/office/powerpoint/2010/main" val="444297826"/>
       </p:ext>
     </p:extLst>
   </p:cSld>
@@ -8322,32 +8370,15 @@
           <a:chExt cx="0" cy="0"/>
         </a:xfrm>
       </p:grpSpPr>
-      <p:sp>
-        <p:nvSpPr>
-          <p:cNvPr id="6" name="Titel 5"/>
-          <p:cNvSpPr>
-            <a:spLocks noGrp="1"/>
-          </p:cNvSpPr>
-          <p:nvPr>
-            <p:ph type="title"/>
-          </p:nvPr>
-        </p:nvSpPr>
-        <p:spPr/>
-        <p:txBody>
-          <a:bodyPr rtlCol="0"/>
-          <a:lstStyle/>
-          <a:p>
-            <a:pPr rtl="0"/>
-            <a:r>
-              <a:rPr lang="de-DE" dirty="0"/>
-              <a:t>Drei Bilder mit Beschriftung</a:t>
-            </a:r>
-          </a:p>
-        </p:txBody>
-      </p:sp>
       <p:pic>
         <p:nvPicPr>
-          <p:cNvPr id="7" name="Bildplatzhalter 6" descr="Gelber Labrador-Retriever in einem Fluss"/>
+          <p:cNvPr id="20" name="Bildplatzhalter 19">
+            <a:extLst>
+              <a:ext uri="{FF2B5EF4-FFF2-40B4-BE49-F238E27FC236}">
+                <a16:creationId xmlns:a16="http://schemas.microsoft.com/office/drawing/2014/main" id="{49EF2987-DCE4-4B0F-B55E-0BB592F0C2C9}"/>
+              </a:ext>
+            </a:extLst>
+          </p:cNvPr>
           <p:cNvPicPr>
             <a:picLocks noGrp="1" noChangeAspect="1"/>
           </p:cNvPicPr>
@@ -8355,92 +8386,170 @@
             <p:ph type="pic" sz="quarter" idx="13"/>
           </p:nvPr>
         </p:nvPicPr>
-        <p:blipFill rotWithShape="1">
-          <a:blip r:embed="rId3" cstate="print">
-            <a:extLst>
-              <a:ext uri="{28A0092B-C50C-407E-A947-70E740481C1C}">
-                <a14:useLocalDpi xmlns:a14="http://schemas.microsoft.com/office/drawing/2010/main" val="0"/>
-              </a:ext>
-            </a:extLst>
-          </a:blip>
-          <a:srcRect/>
-          <a:stretch/>
+        <p:blipFill>
+          <a:blip r:embed="rId3"/>
+          <a:srcRect l="1502" r="1502"/>
+          <a:stretch>
+            <a:fillRect/>
+          </a:stretch>
         </p:blipFill>
         <p:spPr/>
       </p:pic>
+      <p:sp>
+        <p:nvSpPr>
+          <p:cNvPr id="21" name="Textfeld 20">
+            <a:extLst>
+              <a:ext uri="{FF2B5EF4-FFF2-40B4-BE49-F238E27FC236}">
+                <a16:creationId xmlns:a16="http://schemas.microsoft.com/office/drawing/2014/main" id="{E68A9852-27E5-44B7-B23D-97EC0B7FCF70}"/>
+              </a:ext>
+            </a:extLst>
+          </p:cNvPr>
+          <p:cNvSpPr txBox="1"/>
+          <p:nvPr/>
+        </p:nvSpPr>
+        <p:spPr>
+          <a:xfrm>
+            <a:off x="1271464" y="5589240"/>
+            <a:ext cx="5256584" cy="584775"/>
+          </a:xfrm>
+          <a:prstGeom prst="rect">
+            <a:avLst/>
+          </a:prstGeom>
+          <a:noFill/>
+        </p:spPr>
+        <p:txBody>
+          <a:bodyPr wrap="square" rtlCol="0">
+            <a:spAutoFit/>
+          </a:bodyPr>
+          <a:lstStyle/>
+          <a:p>
+            <a:r>
+              <a:rPr lang="de-CH" sz="3200" dirty="0"/>
+              <a:t>GitHub Desktop</a:t>
+            </a:r>
+            <a:endParaRPr lang="en-GB" sz="3200" dirty="0"/>
+          </a:p>
+        </p:txBody>
+      </p:sp>
+      <p:sp>
+        <p:nvSpPr>
+          <p:cNvPr id="22" name="Textfeld 21">
+            <a:extLst>
+              <a:ext uri="{FF2B5EF4-FFF2-40B4-BE49-F238E27FC236}">
+                <a16:creationId xmlns:a16="http://schemas.microsoft.com/office/drawing/2014/main" id="{A236D6FD-A764-4272-BDF7-541CA8BA879B}"/>
+              </a:ext>
+            </a:extLst>
+          </p:cNvPr>
+          <p:cNvSpPr txBox="1"/>
+          <p:nvPr/>
+        </p:nvSpPr>
+        <p:spPr>
+          <a:xfrm>
+            <a:off x="6096000" y="5589239"/>
+            <a:ext cx="5256584" cy="584775"/>
+          </a:xfrm>
+          <a:prstGeom prst="rect">
+            <a:avLst/>
+          </a:prstGeom>
+          <a:noFill/>
+        </p:spPr>
+        <p:txBody>
+          <a:bodyPr wrap="square" rtlCol="0">
+            <a:spAutoFit/>
+          </a:bodyPr>
+          <a:lstStyle/>
+          <a:p>
+            <a:r>
+              <a:rPr lang="de-CH" sz="3200" dirty="0"/>
+              <a:t>Source </a:t>
+            </a:r>
+            <a:r>
+              <a:rPr lang="de-CH" sz="3200" dirty="0" err="1"/>
+              <a:t>tree</a:t>
+            </a:r>
+            <a:endParaRPr lang="en-GB" sz="3200" dirty="0"/>
+          </a:p>
+        </p:txBody>
+      </p:sp>
+      <p:sp>
+        <p:nvSpPr>
+          <p:cNvPr id="27" name="AutoShape 2" descr="Bildergebnis für source tree icon">
+            <a:extLst>
+              <a:ext uri="{FF2B5EF4-FFF2-40B4-BE49-F238E27FC236}">
+                <a16:creationId xmlns:a16="http://schemas.microsoft.com/office/drawing/2014/main" id="{295044DA-4F9E-4B97-A032-7B481D12A695}"/>
+              </a:ext>
+            </a:extLst>
+          </p:cNvPr>
+          <p:cNvSpPr>
+            <a:spLocks noChangeAspect="1" noChangeArrowheads="1"/>
+          </p:cNvSpPr>
+          <p:nvPr/>
+        </p:nvSpPr>
+        <p:spPr bwMode="auto">
+          <a:xfrm>
+            <a:off x="4648200" y="1595438"/>
+            <a:ext cx="2895600" cy="3667125"/>
+          </a:xfrm>
+          <a:prstGeom prst="rect">
+            <a:avLst/>
+          </a:prstGeom>
+          <a:noFill/>
+          <a:extLst>
+            <a:ext uri="{909E8E84-426E-40DD-AFC4-6F175D3DCCD1}">
+              <a14:hiddenFill xmlns:a14="http://schemas.microsoft.com/office/drawing/2010/main">
+                <a:solidFill>
+                  <a:srgbClr val="FFFFFF"/>
+                </a:solidFill>
+              </a14:hiddenFill>
+            </a:ext>
+          </a:extLst>
+        </p:spPr>
+        <p:txBody>
+          <a:bodyPr vert="horz" wrap="square" lIns="91440" tIns="45720" rIns="91440" bIns="45720" numCol="1" anchor="t" anchorCtr="0" compatLnSpc="1">
+            <a:prstTxWarp prst="textNoShape">
+              <a:avLst/>
+            </a:prstTxWarp>
+          </a:bodyPr>
+          <a:lstStyle/>
+          <a:p>
+            <a:endParaRPr lang="en-GB"/>
+          </a:p>
+        </p:txBody>
+      </p:sp>
       <p:pic>
         <p:nvPicPr>
-          <p:cNvPr id="8" name="Bildplatzhalter 7" descr="Zwei junge Mädchen, am Strand stehend"/>
-          <p:cNvPicPr>
-            <a:picLocks noGrp="1" noChangeAspect="1"/>
-          </p:cNvPicPr>
-          <p:nvPr>
-            <p:ph type="pic" sz="quarter" idx="15"/>
-          </p:nvPr>
-        </p:nvPicPr>
-        <p:blipFill rotWithShape="1">
-          <a:blip r:embed="rId4" cstate="print">
+          <p:cNvPr id="30" name="Grafik 29">
             <a:extLst>
-              <a:ext uri="{28A0092B-C50C-407E-A947-70E740481C1C}">
-                <a14:useLocalDpi xmlns:a14="http://schemas.microsoft.com/office/drawing/2010/main" val="0"/>
+              <a:ext uri="{FF2B5EF4-FFF2-40B4-BE49-F238E27FC236}">
+                <a16:creationId xmlns:a16="http://schemas.microsoft.com/office/drawing/2014/main" id="{0B189F1E-8183-438F-8683-F649EA794891}"/>
               </a:ext>
             </a:extLst>
-          </a:blip>
-          <a:srcRect/>
-          <a:stretch/>
+          </p:cNvPr>
+          <p:cNvPicPr>
+            <a:picLocks noChangeAspect="1"/>
+          </p:cNvPicPr>
+          <p:nvPr/>
+        </p:nvPicPr>
+        <p:blipFill>
+          <a:blip r:embed="rId4"/>
+          <a:stretch>
+            <a:fillRect/>
+          </a:stretch>
         </p:blipFill>
-        <p:spPr/>
+        <p:spPr>
+          <a:xfrm>
+            <a:off x="5563310" y="1241945"/>
+            <a:ext cx="3492472" cy="3492472"/>
+          </a:xfrm>
+          <a:prstGeom prst="rect">
+            <a:avLst/>
+          </a:prstGeom>
+        </p:spPr>
       </p:pic>
-      <p:pic>
-        <p:nvPicPr>
-          <p:cNvPr id="9" name="Bildplatzhalter 8" descr="Junges Mädchen mit Seifenblasen"/>
-          <p:cNvPicPr>
-            <a:picLocks noGrp="1" noChangeAspect="1"/>
-          </p:cNvPicPr>
-          <p:nvPr>
-            <p:ph type="pic" sz="quarter" idx="16"/>
-          </p:nvPr>
-        </p:nvPicPr>
-        <p:blipFill rotWithShape="1">
-          <a:blip r:embed="rId5" cstate="print">
-            <a:extLst>
-              <a:ext uri="{28A0092B-C50C-407E-A947-70E740481C1C}">
-                <a14:useLocalDpi xmlns:a14="http://schemas.microsoft.com/office/drawing/2010/main" val="0"/>
-              </a:ext>
-            </a:extLst>
-          </a:blip>
-          <a:srcRect/>
-          <a:stretch/>
-        </p:blipFill>
-        <p:spPr/>
-      </p:pic>
-      <p:sp>
-        <p:nvSpPr>
-          <p:cNvPr id="4" name="Textplatzhalter 3"/>
-          <p:cNvSpPr>
-            <a:spLocks noGrp="1"/>
-          </p:cNvSpPr>
-          <p:nvPr>
-            <p:ph type="body" sz="quarter" idx="14"/>
-          </p:nvPr>
-        </p:nvSpPr>
-        <p:spPr/>
-        <p:txBody>
-          <a:bodyPr rtlCol="0"/>
-          <a:lstStyle/>
-          <a:p>
-            <a:pPr rtl="0"/>
-            <a:r>
-              <a:rPr lang="de-DE" dirty="0"/>
-              <a:t>Beschriftung</a:t>
-            </a:r>
-          </a:p>
-        </p:txBody>
-      </p:sp>
     </p:spTree>
     <p:extLst>
       <p:ext uri="{BB962C8B-B14F-4D97-AF65-F5344CB8AC3E}">
-        <p14:creationId xmlns:p14="http://schemas.microsoft.com/office/powerpoint/2010/main" val="2560558900"/>
+        <p14:creationId xmlns:p14="http://schemas.microsoft.com/office/powerpoint/2010/main" val="3864440091"/>
       </p:ext>
     </p:extLst>
   </p:cSld>
@@ -8479,9 +8588,144 @@
           <a:chExt cx="0" cy="0"/>
         </a:xfrm>
       </p:grpSpPr>
-      <p:sp>
-        <p:nvSpPr>
-          <p:cNvPr id="13" name="Titel 12"/>
+      <p:graphicFrame>
+        <p:nvGraphicFramePr>
+          <p:cNvPr id="7" name="Objekt 6" hidden="1">
+            <a:extLst>
+              <a:ext uri="{FF2B5EF4-FFF2-40B4-BE49-F238E27FC236}">
+                <a16:creationId xmlns:a16="http://schemas.microsoft.com/office/drawing/2014/main" id="{79F15764-8645-417C-A8F5-F40DDE03DEA9}"/>
+              </a:ext>
+            </a:extLst>
+          </p:cNvPr>
+          <p:cNvGraphicFramePr>
+            <a:graphicFrameLocks noChangeAspect="1"/>
+          </p:cNvGraphicFramePr>
+          <p:nvPr>
+            <p:custDataLst>
+              <p:tags r:id="rId2"/>
+            </p:custDataLst>
+            <p:extLst/>
+          </p:nvPr>
+        </p:nvGraphicFramePr>
+        <p:xfrm>
+          <a:off x="1588" y="1588"/>
+          <a:ext cx="1588" cy="1588"/>
+        </p:xfrm>
+        <a:graphic>
+          <a:graphicData uri="http://schemas.openxmlformats.org/presentationml/2006/ole">
+            <mc:AlternateContent xmlns:mc="http://schemas.openxmlformats.org/markup-compatibility/2006">
+              <mc:Choice xmlns:v="urn:schemas-microsoft-com:vml" Requires="v">
+                <p:oleObj spid="_x0000_s11267" name="think-cell Folie" r:id="rId6" imgW="624" imgH="623" progId="TCLayout.ActiveDocument.1">
+                  <p:embed/>
+                </p:oleObj>
+              </mc:Choice>
+              <mc:Fallback>
+                <p:oleObj name="think-cell Folie" r:id="rId6" imgW="624" imgH="623" progId="TCLayout.ActiveDocument.1">
+                  <p:embed/>
+                  <p:pic>
+                    <p:nvPicPr>
+                      <p:cNvPr id="7" name="Objekt 6" hidden="1">
+                        <a:extLst>
+                          <a:ext uri="{FF2B5EF4-FFF2-40B4-BE49-F238E27FC236}">
+                            <a16:creationId xmlns:a16="http://schemas.microsoft.com/office/drawing/2014/main" id="{79F15764-8645-417C-A8F5-F40DDE03DEA9}"/>
+                          </a:ext>
+                        </a:extLst>
+                      </p:cNvPr>
+                      <p:cNvPicPr/>
+                      <p:nvPr/>
+                    </p:nvPicPr>
+                    <p:blipFill>
+                      <a:blip r:embed="rId7"/>
+                      <a:stretch>
+                        <a:fillRect/>
+                      </a:stretch>
+                    </p:blipFill>
+                    <p:spPr>
+                      <a:xfrm>
+                        <a:off x="1588" y="1588"/>
+                        <a:ext cx="1588" cy="1588"/>
+                      </a:xfrm>
+                      <a:prstGeom prst="rect">
+                        <a:avLst/>
+                      </a:prstGeom>
+                    </p:spPr>
+                  </p:pic>
+                </p:oleObj>
+              </mc:Fallback>
+            </mc:AlternateContent>
+          </a:graphicData>
+        </a:graphic>
+      </p:graphicFrame>
+      <p:sp>
+        <p:nvSpPr>
+          <p:cNvPr id="6" name="Rechteck 5" hidden="1">
+            <a:extLst>
+              <a:ext uri="{FF2B5EF4-FFF2-40B4-BE49-F238E27FC236}">
+                <a16:creationId xmlns:a16="http://schemas.microsoft.com/office/drawing/2014/main" id="{12D0C613-B704-4D25-B7C9-BE88395369A9}"/>
+              </a:ext>
+            </a:extLst>
+          </p:cNvPr>
+          <p:cNvSpPr/>
+          <p:nvPr>
+            <p:custDataLst>
+              <p:tags r:id="rId3"/>
+            </p:custDataLst>
+          </p:nvPr>
+        </p:nvSpPr>
+        <p:spPr>
+          <a:xfrm>
+            <a:off x="0" y="0"/>
+            <a:ext cx="158750" cy="158750"/>
+          </a:xfrm>
+          <a:prstGeom prst="rect">
+            <a:avLst/>
+          </a:prstGeom>
+        </p:spPr>
+        <p:style>
+          <a:lnRef idx="2">
+            <a:schemeClr val="accent1">
+              <a:shade val="50000"/>
+            </a:schemeClr>
+          </a:lnRef>
+          <a:fillRef idx="1">
+            <a:schemeClr val="accent1"/>
+          </a:fillRef>
+          <a:effectRef idx="0">
+            <a:schemeClr val="accent1"/>
+          </a:effectRef>
+          <a:fontRef idx="minor">
+            <a:schemeClr val="lt1"/>
+          </a:fontRef>
+        </p:style>
+        <p:txBody>
+          <a:bodyPr vert="horz" wrap="none" lIns="0" tIns="0" rIns="0" bIns="0" numCol="1" spcCol="0" rtlCol="0" anchor="ctr" anchorCtr="0">
+            <a:noAutofit/>
+          </a:bodyPr>
+          <a:lstStyle/>
+          <a:p>
+            <a:pPr algn="ctr">
+              <a:lnSpc>
+                <a:spcPct val="90000"/>
+              </a:lnSpc>
+              <a:spcBef>
+                <a:spcPct val="0"/>
+              </a:spcBef>
+              <a:spcAft>
+                <a:spcPct val="0"/>
+              </a:spcAft>
+            </a:pPr>
+            <a:endParaRPr lang="de-DE" sz="3200" dirty="0">
+              <a:latin typeface="Times New Roman" panose="02020603050405020304" pitchFamily="18" charset="0"/>
+              <a:ea typeface="+mj-ea"/>
+              <a:cs typeface="+mj-cs"/>
+              <a:sym typeface="Times New Roman" panose="02020603050405020304" pitchFamily="18" charset="0"/>
+            </a:endParaRPr>
+          </a:p>
+        </p:txBody>
+      </p:sp>
+      <p:sp>
+        <p:nvSpPr>
+          <p:cNvPr id="2" name="Titel 1"/>
           <p:cNvSpPr>
             <a:spLocks noGrp="1"/>
           </p:cNvSpPr>
@@ -8496,135 +8740,133 @@
           <a:p>
             <a:pPr rtl="0"/>
             <a:r>
+              <a:rPr lang="de-DE" dirty="0" err="1"/>
+              <a:t>Ignoring</a:t>
+            </a:r>
+            <a:r>
               <a:rPr lang="de-DE" dirty="0"/>
-              <a:t>Fünf Bilder</a:t>
+              <a:t> </a:t>
+            </a:r>
+            <a:r>
+              <a:rPr lang="de-DE" dirty="0" err="1"/>
+              <a:t>files</a:t>
+            </a:r>
+            <a:endParaRPr lang="de-DE" dirty="0"/>
+          </a:p>
+        </p:txBody>
+      </p:sp>
+      <p:sp>
+        <p:nvSpPr>
+          <p:cNvPr id="3" name="Textplatzhalter 2"/>
+          <p:cNvSpPr>
+            <a:spLocks noGrp="1"/>
+          </p:cNvSpPr>
+          <p:nvPr>
+            <p:ph type="body" sz="half" idx="2"/>
+          </p:nvPr>
+        </p:nvSpPr>
+        <p:spPr>
+          <a:xfrm>
+            <a:off x="7010400" y="1628800"/>
+            <a:ext cx="3657600" cy="2811755"/>
+          </a:xfrm>
+        </p:spPr>
+        <p:txBody>
+          <a:bodyPr rtlCol="0"/>
+          <a:lstStyle/>
+          <a:p>
+            <a:pPr marL="285750" indent="-285750" rtl="0">
+              <a:buFontTx/>
+              <a:buChar char="-"/>
+            </a:pPr>
+            <a:r>
+              <a:rPr lang="de-DE" dirty="0"/>
+              <a:t>Zum Projekt .</a:t>
+            </a:r>
+            <a:r>
+              <a:rPr lang="de-DE" dirty="0" err="1"/>
+              <a:t>gitignore</a:t>
+            </a:r>
+            <a:r>
+              <a:rPr lang="de-DE" dirty="0"/>
+              <a:t> File hinzufügen und erst dann </a:t>
+            </a:r>
+            <a:r>
+              <a:rPr lang="de-DE" dirty="0" err="1"/>
+              <a:t>commite</a:t>
+            </a:r>
+            <a:endParaRPr lang="de-DE" dirty="0"/>
+          </a:p>
+          <a:p>
+            <a:pPr marL="285750" indent="-285750" rtl="0">
+              <a:buFontTx/>
+              <a:buChar char="-"/>
+            </a:pPr>
+            <a:r>
+              <a:rPr lang="de-DE" dirty="0"/>
+              <a:t>Durch das File wird </a:t>
+            </a:r>
+            <a:r>
+              <a:rPr lang="de-DE" dirty="0" err="1"/>
+              <a:t>gererierter</a:t>
+            </a:r>
+            <a:r>
+              <a:rPr lang="de-DE" dirty="0"/>
+              <a:t> Code und alle Textfiles </a:t>
+            </a:r>
+            <a:r>
+              <a:rPr lang="de-DE" dirty="0" err="1"/>
+              <a:t>iognoriert</a:t>
+            </a:r>
+            <a:r>
+              <a:rPr lang="de-DE" dirty="0"/>
+              <a:t>, bzw. nicht </a:t>
+            </a:r>
+            <a:r>
+              <a:rPr lang="de-DE" dirty="0" err="1"/>
+              <a:t>commited</a:t>
+            </a:r>
+            <a:r>
+              <a:rPr lang="de-DE" dirty="0"/>
+              <a:t> </a:t>
             </a:r>
           </a:p>
         </p:txBody>
       </p:sp>
       <p:pic>
         <p:nvPicPr>
-          <p:cNvPr id="10" name="Bildplatzhalter 9" descr="Mädchen , Blaubeeren essend"/>
+          <p:cNvPr id="4" name="Grafik 3">
+            <a:extLst>
+              <a:ext uri="{FF2B5EF4-FFF2-40B4-BE49-F238E27FC236}">
+                <a16:creationId xmlns:a16="http://schemas.microsoft.com/office/drawing/2014/main" id="{7E0AF16A-3775-4453-B5DB-AF939DD52EFF}"/>
+              </a:ext>
+            </a:extLst>
+          </p:cNvPr>
           <p:cNvPicPr>
-            <a:picLocks noGrp="1" noChangeAspect="1"/>
+            <a:picLocks noChangeAspect="1"/>
           </p:cNvPicPr>
-          <p:nvPr>
-            <p:ph type="pic" sz="quarter" idx="13"/>
-          </p:nvPr>
+          <p:nvPr/>
         </p:nvPicPr>
         <p:blipFill>
-          <a:blip r:embed="rId3" cstate="print">
-            <a:extLst>
-              <a:ext uri="{28A0092B-C50C-407E-A947-70E740481C1C}">
-                <a14:useLocalDpi xmlns:a14="http://schemas.microsoft.com/office/drawing/2010/main" val="0"/>
-              </a:ext>
-            </a:extLst>
-          </a:blip>
-          <a:srcRect t="109" b="109"/>
+          <a:blip r:embed="rId8"/>
           <a:stretch>
             <a:fillRect/>
           </a:stretch>
         </p:blipFill>
-        <p:spPr/>
-      </p:pic>
-      <p:pic>
-        <p:nvPicPr>
-          <p:cNvPr id="7" name="Bildplatzhalter 6" descr="Mädchen und Junge in Regenmänteln"/>
-          <p:cNvPicPr>
-            <a:picLocks noGrp="1" noChangeAspect="1"/>
-          </p:cNvPicPr>
-          <p:nvPr>
-            <p:ph type="pic" sz="quarter" idx="15"/>
-          </p:nvPr>
-        </p:nvPicPr>
-        <p:blipFill rotWithShape="1">
-          <a:blip r:embed="rId4" cstate="print">
-            <a:extLst>
-              <a:ext uri="{28A0092B-C50C-407E-A947-70E740481C1C}">
-                <a14:useLocalDpi xmlns:a14="http://schemas.microsoft.com/office/drawing/2010/main" val="0"/>
-              </a:ext>
-            </a:extLst>
-          </a:blip>
-          <a:srcRect t="209" b="209"/>
-          <a:stretch/>
-        </p:blipFill>
-        <p:spPr/>
-      </p:pic>
-      <p:pic>
-        <p:nvPicPr>
-          <p:cNvPr id="8" name="Bildplatzhalter 7" descr="Aufgeschnittene Wassermelone"/>
-          <p:cNvPicPr>
-            <a:picLocks noGrp="1" noChangeAspect="1"/>
-          </p:cNvPicPr>
-          <p:nvPr>
-            <p:ph type="pic" sz="quarter" idx="16"/>
-          </p:nvPr>
-        </p:nvPicPr>
-        <p:blipFill>
-          <a:blip r:embed="rId5" cstate="print">
-            <a:extLst>
-              <a:ext uri="{28A0092B-C50C-407E-A947-70E740481C1C}">
-                <a14:useLocalDpi xmlns:a14="http://schemas.microsoft.com/office/drawing/2010/main" val="0"/>
-              </a:ext>
-            </a:extLst>
-          </a:blip>
-          <a:srcRect l="143" r="143"/>
-          <a:stretch>
-            <a:fillRect/>
-          </a:stretch>
-        </p:blipFill>
-        <p:spPr/>
-      </p:pic>
-      <p:pic>
-        <p:nvPicPr>
-          <p:cNvPr id="9" name="Bildplatzhalter 8" descr="Junges Mädchen im blauen Regenmantel"/>
-          <p:cNvPicPr>
-            <a:picLocks noGrp="1" noChangeAspect="1"/>
-          </p:cNvPicPr>
-          <p:nvPr>
-            <p:ph type="pic" sz="quarter" idx="17"/>
-          </p:nvPr>
-        </p:nvPicPr>
-        <p:blipFill rotWithShape="1">
-          <a:blip r:embed="rId6" cstate="print">
-            <a:extLst>
-              <a:ext uri="{28A0092B-C50C-407E-A947-70E740481C1C}">
-                <a14:useLocalDpi xmlns:a14="http://schemas.microsoft.com/office/drawing/2010/main" val="0"/>
-              </a:ext>
-            </a:extLst>
-          </a:blip>
-          <a:srcRect l="37" r="37"/>
-          <a:stretch/>
-        </p:blipFill>
-        <p:spPr/>
-      </p:pic>
-      <p:pic>
-        <p:nvPicPr>
-          <p:cNvPr id="11" name="Bildplatzhalter 10" descr="Kleiner Junge in einer Strickhängematte"/>
-          <p:cNvPicPr>
-            <a:picLocks noGrp="1" noChangeAspect="1"/>
-          </p:cNvPicPr>
-          <p:nvPr>
-            <p:ph type="pic" sz="quarter" idx="18"/>
-          </p:nvPr>
-        </p:nvPicPr>
-        <p:blipFill rotWithShape="1">
-          <a:blip r:embed="rId7" cstate="print">
-            <a:extLst>
-              <a:ext uri="{28A0092B-C50C-407E-A947-70E740481C1C}">
-                <a14:useLocalDpi xmlns:a14="http://schemas.microsoft.com/office/drawing/2010/main" val="0"/>
-              </a:ext>
-            </a:extLst>
-          </a:blip>
-          <a:srcRect l="3" r="3"/>
-          <a:stretch/>
-        </p:blipFill>
-        <p:spPr/>
+        <p:spPr>
+          <a:xfrm>
+            <a:off x="983432" y="2730440"/>
+            <a:ext cx="5184576" cy="1438855"/>
+          </a:xfrm>
+          <a:prstGeom prst="rect">
+            <a:avLst/>
+          </a:prstGeom>
+        </p:spPr>
       </p:pic>
     </p:spTree>
     <p:extLst>
       <p:ext uri="{BB962C8B-B14F-4D97-AF65-F5344CB8AC3E}">
-        <p14:creationId xmlns:p14="http://schemas.microsoft.com/office/powerpoint/2010/main" val="807962408"/>
+        <p14:creationId xmlns:p14="http://schemas.microsoft.com/office/powerpoint/2010/main" val="3018903544"/>
       </p:ext>
     </p:extLst>
   </p:cSld>
@@ -8694,7 +8936,7 @@
           <a:graphicData uri="http://schemas.openxmlformats.org/presentationml/2006/ole">
             <mc:AlternateContent xmlns:mc="http://schemas.openxmlformats.org/markup-compatibility/2006">
               <mc:Choice xmlns:v="urn:schemas-microsoft-com:vml" Requires="v">
-                <p:oleObj spid="_x0000_s6147" name="think-cell Folie" r:id="rId6" imgW="624" imgH="623" progId="TCLayout.ActiveDocument.1">
+                <p:oleObj spid="_x0000_s6149" name="think-cell Folie" r:id="rId6" imgW="624" imgH="623" progId="TCLayout.ActiveDocument.1">
                   <p:embed/>
                 </p:oleObj>
               </mc:Choice>
@@ -8897,7 +9139,7 @@
           <a:graphicData uri="http://schemas.openxmlformats.org/presentationml/2006/ole">
             <mc:AlternateContent xmlns:mc="http://schemas.openxmlformats.org/markup-compatibility/2006">
               <mc:Choice xmlns:v="urn:schemas-microsoft-com:vml" Requires="v">
-                <p:oleObj spid="_x0000_s7171" name="think-cell Folie" r:id="rId6" imgW="624" imgH="623" progId="TCLayout.ActiveDocument.1">
+                <p:oleObj spid="_x0000_s7173" name="think-cell Folie" r:id="rId6" imgW="624" imgH="623" progId="TCLayout.ActiveDocument.1">
                   <p:embed/>
                 </p:oleObj>
               </mc:Choice>
@@ -9255,7 +9497,7 @@
           <a:graphicData uri="http://schemas.openxmlformats.org/presentationml/2006/ole">
             <mc:AlternateContent xmlns:mc="http://schemas.openxmlformats.org/markup-compatibility/2006">
               <mc:Choice xmlns:v="urn:schemas-microsoft-com:vml" Requires="v">
-                <p:oleObj spid="_x0000_s3078" name="think-cell Folie" r:id="rId6" imgW="624" imgH="623" progId="TCLayout.ActiveDocument.1">
+                <p:oleObj spid="_x0000_s3080" name="think-cell Folie" r:id="rId6" imgW="624" imgH="623" progId="TCLayout.ActiveDocument.1">
                   <p:embed/>
                 </p:oleObj>
               </mc:Choice>
@@ -9400,26 +9642,22 @@
             <a:pPr rtl="0"/>
             <a:r>
               <a:rPr lang="de-DE" b="1" dirty="0"/>
-              <a:t>F: </a:t>
-            </a:r>
-            <a:r>
-              <a:rPr lang="de-DE" dirty="0"/>
-              <a:t>Warum stellt man das </a:t>
-            </a:r>
-            <a:r>
-              <a:rPr lang="de-DE" dirty="0" err="1"/>
+              <a:t>F: Warum stellt man das </a:t>
+            </a:r>
+            <a:r>
+              <a:rPr lang="de-DE" b="1" dirty="0" err="1"/>
               <a:t>Object</a:t>
             </a:r>
             <a:r>
-              <a:rPr lang="de-DE" dirty="0"/>
+              <a:rPr lang="de-DE" b="1" dirty="0"/>
               <a:t>-File (</a:t>
             </a:r>
             <a:r>
-              <a:rPr lang="de-DE" dirty="0" err="1"/>
+              <a:rPr lang="de-DE" b="1" dirty="0" err="1"/>
               <a:t>z.B</a:t>
             </a:r>
             <a:r>
-              <a:rPr lang="de-DE" dirty="0"/>
+              <a:rPr lang="de-DE" b="1" dirty="0"/>
               <a:t> main.obj) nicht in ein Verwaltungssystem wie beispielsweise GitHub?</a:t>
             </a:r>
           </a:p>
@@ -9630,7 +9868,7 @@
           <a:graphicData uri="http://schemas.openxmlformats.org/presentationml/2006/ole">
             <mc:AlternateContent xmlns:mc="http://schemas.openxmlformats.org/markup-compatibility/2006">
               <mc:Choice xmlns:v="urn:schemas-microsoft-com:vml" Requires="v">
-                <p:oleObj spid="_x0000_s4102" name="think-cell Folie" r:id="rId6" imgW="624" imgH="623" progId="TCLayout.ActiveDocument.1">
+                <p:oleObj spid="_x0000_s4104" name="think-cell Folie" r:id="rId6" imgW="624" imgH="623" progId="TCLayout.ActiveDocument.1">
                   <p:embed/>
                 </p:oleObj>
               </mc:Choice>
@@ -9781,11 +10019,7 @@
             <a:pPr rtl="0"/>
             <a:r>
               <a:rPr lang="de-DE" b="1" dirty="0"/>
-              <a:t>F: </a:t>
-            </a:r>
-            <a:r>
-              <a:rPr lang="de-DE" dirty="0"/>
-              <a:t>Was könnte der Grund sein, dass, man das  Projekt plötzlich nicht mehr übersetzen kann)</a:t>
+              <a:t>F: Was könnte der Grund sein, dass, man das  Projekt plötzlich nicht mehr übersetzen kann)</a:t>
             </a:r>
           </a:p>
           <a:p>
@@ -9981,7 +10215,7 @@
 
 <file path=ppt/tags/tag11.xml><?xml version="1.0" encoding="utf-8"?>
 <p:tagLst xmlns:a="http://schemas.openxmlformats.org/drawingml/2006/main" xmlns:r="http://schemas.openxmlformats.org/officeDocument/2006/relationships" xmlns:p="http://schemas.openxmlformats.org/presentationml/2006/main">
-  <p:tag name="THINKCELLSHAPEDONOTDELETE" val="tqd2cb32ZQkqaKVJLtkjegQ"/>
+  <p:tag name="THINKCELLSHAPEDONOTDELETE" val="ti_m7J4YsS2KjZ3V6OXZpBQ"/>
 </p:tagLst>
 </file>
 
@@ -10004,6 +10238,30 @@
 </file>
 
 <file path=ppt/tags/tag15.xml><?xml version="1.0" encoding="utf-8"?>
+<p:tagLst xmlns:a="http://schemas.openxmlformats.org/drawingml/2006/main" xmlns:r="http://schemas.openxmlformats.org/officeDocument/2006/relationships" xmlns:p="http://schemas.openxmlformats.org/presentationml/2006/main">
+  <p:tag name="THINKCELLSHAPEDONOTDELETE" val="tqd2cb32ZQkqaKVJLtkjegQ"/>
+</p:tagLst>
+</file>
+
+<file path=ppt/tags/tag16.xml><?xml version="1.0" encoding="utf-8"?>
+<p:tagLst xmlns:a="http://schemas.openxmlformats.org/drawingml/2006/main" xmlns:r="http://schemas.openxmlformats.org/officeDocument/2006/relationships" xmlns:p="http://schemas.openxmlformats.org/presentationml/2006/main">
+  <p:tag name="THINKCELLSHAPEDONOTDELETE" val="thinkcellActiveDocDoNotDelete"/>
+</p:tagLst>
+</file>
+
+<file path=ppt/tags/tag17.xml><?xml version="1.0" encoding="utf-8"?>
+<p:tagLst xmlns:a="http://schemas.openxmlformats.org/drawingml/2006/main" xmlns:r="http://schemas.openxmlformats.org/officeDocument/2006/relationships" xmlns:p="http://schemas.openxmlformats.org/presentationml/2006/main">
+  <p:tag name="THINKCELLSHAPEDONOTDELETE" val="tqd2cb32ZQkqaKVJLtkjegQ"/>
+</p:tagLst>
+</file>
+
+<file path=ppt/tags/tag18.xml><?xml version="1.0" encoding="utf-8"?>
+<p:tagLst xmlns:a="http://schemas.openxmlformats.org/drawingml/2006/main" xmlns:r="http://schemas.openxmlformats.org/officeDocument/2006/relationships" xmlns:p="http://schemas.openxmlformats.org/presentationml/2006/main">
+  <p:tag name="THINKCELLSHAPEDONOTDELETE" val="thinkcellActiveDocDoNotDelete"/>
+</p:tagLst>
+</file>
+
+<file path=ppt/tags/tag19.xml><?xml version="1.0" encoding="utf-8"?>
 <p:tagLst xmlns:a="http://schemas.openxmlformats.org/drawingml/2006/main" xmlns:r="http://schemas.openxmlformats.org/officeDocument/2006/relationships" xmlns:p="http://schemas.openxmlformats.org/presentationml/2006/main">
   <p:tag name="THINKCELLSHAPEDONOTDELETE" val="tKWe1Bb6UQqSyzY7tkz4J2g"/>
 </p:tagLst>
@@ -10041,7 +10299,7 @@
 
 <file path=ppt/tags/tag7.xml><?xml version="1.0" encoding="utf-8"?>
 <p:tagLst xmlns:a="http://schemas.openxmlformats.org/drawingml/2006/main" xmlns:r="http://schemas.openxmlformats.org/officeDocument/2006/relationships" xmlns:p="http://schemas.openxmlformats.org/presentationml/2006/main">
-  <p:tag name="THINKCELLSHAPEDONOTDELETE" val="ti_m7J4YsS2KjZ3V6OXZpBQ"/>
+  <p:tag name="THINKCELLSHAPEDONOTDELETE" val="tFSvwoB6vQri361h8Z9IN8g"/>
 </p:tagLst>
 </file>
 
@@ -10053,7 +10311,7 @@
 
 <file path=ppt/tags/tag9.xml><?xml version="1.0" encoding="utf-8"?>
 <p:tagLst xmlns:a="http://schemas.openxmlformats.org/drawingml/2006/main" xmlns:r="http://schemas.openxmlformats.org/officeDocument/2006/relationships" xmlns:p="http://schemas.openxmlformats.org/presentationml/2006/main">
-  <p:tag name="THINKCELLSHAPEDONOTDELETE" val="tqd2cb32ZQkqaKVJLtkjegQ"/>
+  <p:tag name="THINKCELLSHAPEDONOTDELETE" val="tLjSbRRWWRhewStM98COTig"/>
 </p:tagLst>
 </file>
 
@@ -10841,12 +11099,14 @@
 </file>
 
 <file path=customXml/item1.xml><?xml version="1.0" encoding="utf-8"?>
-<?mso-contentType ?>
-<FormTemplates xmlns="http://schemas.microsoft.com/sharepoint/v3/contenttype/forms">
-  <Display>DocumentLibraryForm</Display>
-  <Edit>DocumentLibraryForm</Edit>
-  <New>DocumentLibraryForm</New>
-</FormTemplates>
+<p:properties xmlns:p="http://schemas.microsoft.com/office/2006/metadata/properties" xmlns:xsi="http://www.w3.org/2001/XMLSchema-instance" xmlns:pc="http://schemas.microsoft.com/office/infopath/2007/PartnerControls">
+  <documentManagement>
+    <VSO_x0020_item_x0020_id xmlns="40262f94-9f35-4ac3-9a90-690165a166b7" xsi:nil="true"/>
+    <Assetid_x0020_ xmlns="40262f94-9f35-4ac3-9a90-690165a166b7" xsi:nil="true"/>
+    <Item_x0020_Details xmlns="40262f94-9f35-4ac3-9a90-690165a166b7" xsi:nil="true"/>
+    <Template_x0020_details xmlns="40262f94-9f35-4ac3-9a90-690165a166b7" xsi:nil="true"/>
+  </documentManagement>
+</p:properties>
 </file>
 
 <file path=customXml/item2.xml><?xml version="1.0" encoding="utf-8"?>
@@ -11031,20 +11291,27 @@
 </file>
 
 <file path=customXml/item3.xml><?xml version="1.0" encoding="utf-8"?>
-<p:properties xmlns:p="http://schemas.microsoft.com/office/2006/metadata/properties" xmlns:xsi="http://www.w3.org/2001/XMLSchema-instance" xmlns:pc="http://schemas.microsoft.com/office/infopath/2007/PartnerControls">
-  <documentManagement>
-    <VSO_x0020_item_x0020_id xmlns="40262f94-9f35-4ac3-9a90-690165a166b7" xsi:nil="true"/>
-    <Assetid_x0020_ xmlns="40262f94-9f35-4ac3-9a90-690165a166b7" xsi:nil="true"/>
-    <Item_x0020_Details xmlns="40262f94-9f35-4ac3-9a90-690165a166b7" xsi:nil="true"/>
-    <Template_x0020_details xmlns="40262f94-9f35-4ac3-9a90-690165a166b7" xsi:nil="true"/>
-  </documentManagement>
-</p:properties>
+<?mso-contentType ?>
+<FormTemplates xmlns="http://schemas.microsoft.com/sharepoint/v3/contenttype/forms">
+  <Display>DocumentLibraryForm</Display>
+  <Edit>DocumentLibraryForm</Edit>
+  <New>DocumentLibraryForm</New>
+</FormTemplates>
 </file>
 
 <file path=customXml/itemProps1.xml><?xml version="1.0" encoding="utf-8"?>
-<ds:datastoreItem xmlns:ds="http://schemas.openxmlformats.org/officeDocument/2006/customXml" ds:itemID="{9EDF6667-B669-49A4-BBE6-2132BA71C0C7}">
+<ds:datastoreItem xmlns:ds="http://schemas.openxmlformats.org/officeDocument/2006/customXml" ds:itemID="{1DA15C6C-6BB6-4DB6-B7D6-7F14EAB2CC5C}">
   <ds:schemaRefs>
-    <ds:schemaRef ds:uri="http://schemas.microsoft.com/sharepoint/v3/contenttype/forms"/>
+    <ds:schemaRef ds:uri="http://schemas.microsoft.com/office/2006/documentManagement/types"/>
+    <ds:schemaRef ds:uri="http://schemas.openxmlformats.org/package/2006/metadata/core-properties"/>
+    <ds:schemaRef ds:uri="http://purl.org/dc/elements/1.1/"/>
+    <ds:schemaRef ds:uri="http://www.w3.org/XML/1998/namespace"/>
+    <ds:schemaRef ds:uri="40262f94-9f35-4ac3-9a90-690165a166b7"/>
+    <ds:schemaRef ds:uri="http://purl.org/dc/dcmitype/"/>
+    <ds:schemaRef ds:uri="a4f35948-e619-41b3-aa29-22878b09cfd2"/>
+    <ds:schemaRef ds:uri="http://schemas.microsoft.com/office/infopath/2007/PartnerControls"/>
+    <ds:schemaRef ds:uri="http://schemas.microsoft.com/office/2006/metadata/properties"/>
+    <ds:schemaRef ds:uri="http://purl.org/dc/terms/"/>
   </ds:schemaRefs>
 </ds:datastoreItem>
 </file>
@@ -11069,18 +11336,9 @@
 </file>
 
 <file path=customXml/itemProps3.xml><?xml version="1.0" encoding="utf-8"?>
-<ds:datastoreItem xmlns:ds="http://schemas.openxmlformats.org/officeDocument/2006/customXml" ds:itemID="{1DA15C6C-6BB6-4DB6-B7D6-7F14EAB2CC5C}">
+<ds:datastoreItem xmlns:ds="http://schemas.openxmlformats.org/officeDocument/2006/customXml" ds:itemID="{9EDF6667-B669-49A4-BBE6-2132BA71C0C7}">
   <ds:schemaRefs>
-    <ds:schemaRef ds:uri="http://schemas.microsoft.com/office/2006/documentManagement/types"/>
-    <ds:schemaRef ds:uri="http://schemas.openxmlformats.org/package/2006/metadata/core-properties"/>
-    <ds:schemaRef ds:uri="http://purl.org/dc/elements/1.1/"/>
-    <ds:schemaRef ds:uri="http://www.w3.org/XML/1998/namespace"/>
-    <ds:schemaRef ds:uri="40262f94-9f35-4ac3-9a90-690165a166b7"/>
-    <ds:schemaRef ds:uri="http://purl.org/dc/dcmitype/"/>
-    <ds:schemaRef ds:uri="a4f35948-e619-41b3-aa29-22878b09cfd2"/>
-    <ds:schemaRef ds:uri="http://schemas.microsoft.com/office/infopath/2007/PartnerControls"/>
-    <ds:schemaRef ds:uri="http://schemas.microsoft.com/office/2006/metadata/properties"/>
-    <ds:schemaRef ds:uri="http://purl.org/dc/terms/"/>
+    <ds:schemaRef ds:uri="http://schemas.microsoft.com/sharepoint/v3/contenttype/forms"/>
   </ds:schemaRefs>
 </ds:datastoreItem>
 </file>
</xml_diff>